<commit_message>
add ppt + change path api + add screenshot
</commit_message>
<xml_diff>
--- a/gestion_projet/soutenance/Presentation_DreamTeamCoworking.pptx
+++ b/gestion_projet/soutenance/Presentation_DreamTeamCoworking.pptx
@@ -5,7 +5,7 @@
     <p:sldMasterId id="2147483648" r:id="rId2"/>
   </p:sldMasterIdLst>
   <p:handoutMasterIdLst>
-    <p:handoutMasterId r:id="rId31"/>
+    <p:handoutMasterId r:id="rId32"/>
   </p:handoutMasterIdLst>
   <p:sldIdLst>
     <p:sldId id="256" r:id="rId3"/>
@@ -32,10 +32,11 @@
     <p:sldId id="283" r:id="rId24"/>
     <p:sldId id="284" r:id="rId25"/>
     <p:sldId id="285" r:id="rId26"/>
-    <p:sldId id="259" r:id="rId27"/>
-    <p:sldId id="261" r:id="rId28"/>
-    <p:sldId id="262" r:id="rId29"/>
-    <p:sldId id="265" r:id="rId30"/>
+    <p:sldId id="289" r:id="rId27"/>
+    <p:sldId id="259" r:id="rId28"/>
+    <p:sldId id="261" r:id="rId29"/>
+    <p:sldId id="262" r:id="rId30"/>
+    <p:sldId id="265" r:id="rId31"/>
   </p:sldIdLst>
   <p:sldSz cx="9144000" cy="5143500" type="screen16x9"/>
   <p:notesSz cx="6858000" cy="9144000"/>
@@ -6174,12 +6175,72 @@
       </p:grpSpPr>
       <p:sp>
         <p:nvSpPr>
+          <p:cNvPr id="2" name="Titre 1"/>
+          <p:cNvSpPr>
+            <a:spLocks noGrp="1"/>
+          </p:cNvSpPr>
+          <p:nvPr>
+            <p:ph type="title"/>
+          </p:nvPr>
+        </p:nvSpPr>
+        <p:spPr>
+          <a:xfrm>
+            <a:off x="1792288" y="4565733"/>
+            <a:ext cx="5486400" cy="425054"/>
+          </a:xfrm>
+        </p:spPr>
+        <p:txBody>
+          <a:bodyPr/>
+          <a:lstStyle/>
+          <a:p>
+            <a:pPr marL="0" indent="0" algn="ctr">
+              <a:buNone/>
+            </a:pPr>
+            <a:r>
+              <a:rPr lang="fr-FR" dirty="0"/>
+              <a:t>Rapport </a:t>
+            </a:r>
+            <a:r>
+              <a:rPr lang="fr-FR" dirty="0" err="1"/>
+              <a:t>PHPUnit</a:t>
+            </a:r>
+            <a:endParaRPr lang="fr-FR" dirty="0"/>
+          </a:p>
+        </p:txBody>
+      </p:sp>
+      <p:sp>
+        <p:nvSpPr>
           <p:cNvPr id="5" name="Espace réservé du texte 4"/>
           <p:cNvSpPr>
             <a:spLocks noGrp="1"/>
           </p:cNvSpPr>
           <p:nvPr>
-            <p:ph type="body" sz="quarter" idx="13"/>
+            <p:ph type="body" sz="quarter" idx="14"/>
+          </p:nvPr>
+        </p:nvSpPr>
+        <p:spPr/>
+        <p:txBody>
+          <a:bodyPr/>
+          <a:lstStyle/>
+          <a:p>
+            <a:r>
+              <a:rPr lang="fr-FR" dirty="0"/>
+              <a:t>Présentation du projet</a:t>
+            </a:r>
+          </a:p>
+          <a:p>
+            <a:endParaRPr lang="fr-FR" dirty="0"/>
+          </a:p>
+        </p:txBody>
+      </p:sp>
+      <p:sp>
+        <p:nvSpPr>
+          <p:cNvPr id="6" name="Espace réservé du texte 5"/>
+          <p:cNvSpPr>
+            <a:spLocks noGrp="1"/>
+          </p:cNvSpPr>
+          <p:nvPr>
+            <p:ph type="body" sz="quarter" idx="15"/>
           </p:nvPr>
         </p:nvSpPr>
         <p:spPr/>
@@ -6191,105 +6252,38 @@
           </a:p>
         </p:txBody>
       </p:sp>
-      <p:sp>
-        <p:nvSpPr>
-          <p:cNvPr id="3" name="Espace réservé du contenu 2"/>
-          <p:cNvSpPr>
-            <a:spLocks noGrp="1"/>
-          </p:cNvSpPr>
-          <p:nvPr>
-            <p:ph sz="half" idx="1"/>
-          </p:nvPr>
-        </p:nvSpPr>
-        <p:spPr/>
-        <p:txBody>
-          <a:bodyPr/>
-          <a:lstStyle/>
-          <a:p>
-            <a:endParaRPr lang="fr-FR"/>
-          </a:p>
-        </p:txBody>
-      </p:sp>
-      <p:sp>
-        <p:nvSpPr>
-          <p:cNvPr id="4" name="Espace réservé du contenu 3"/>
-          <p:cNvSpPr>
-            <a:spLocks noGrp="1"/>
-          </p:cNvSpPr>
-          <p:nvPr>
-            <p:ph sz="half" idx="2"/>
-          </p:nvPr>
-        </p:nvSpPr>
-        <p:spPr/>
-        <p:txBody>
-          <a:bodyPr/>
-          <a:lstStyle/>
-          <a:p>
-            <a:endParaRPr lang="fr-FR"/>
-          </a:p>
-        </p:txBody>
-      </p:sp>
-      <p:sp>
-        <p:nvSpPr>
-          <p:cNvPr id="2" name="Titre 1"/>
-          <p:cNvSpPr>
-            <a:spLocks noGrp="1"/>
-          </p:cNvSpPr>
-          <p:nvPr>
-            <p:ph type="title"/>
-          </p:nvPr>
-        </p:nvSpPr>
-        <p:spPr/>
-        <p:txBody>
-          <a:bodyPr/>
-          <a:lstStyle/>
-          <a:p>
-            <a:endParaRPr lang="fr-FR"/>
-          </a:p>
-        </p:txBody>
-      </p:sp>
-      <p:sp>
-        <p:nvSpPr>
-          <p:cNvPr id="6" name="Espace réservé du texte 5"/>
-          <p:cNvSpPr>
-            <a:spLocks noGrp="1"/>
-          </p:cNvSpPr>
-          <p:nvPr>
-            <p:ph type="body" sz="quarter" idx="15"/>
-          </p:nvPr>
-        </p:nvSpPr>
-        <p:spPr/>
-        <p:txBody>
-          <a:bodyPr/>
-          <a:lstStyle/>
-          <a:p>
-            <a:endParaRPr lang="fr-FR"/>
-          </a:p>
-        </p:txBody>
-      </p:sp>
-      <p:sp>
-        <p:nvSpPr>
-          <p:cNvPr id="7" name="Espace réservé du texte 6"/>
-          <p:cNvSpPr>
-            <a:spLocks noGrp="1"/>
-          </p:cNvSpPr>
-          <p:nvPr>
-            <p:ph type="body" sz="quarter" idx="16"/>
-          </p:nvPr>
-        </p:nvSpPr>
-        <p:spPr/>
-        <p:txBody>
-          <a:bodyPr/>
-          <a:lstStyle/>
-          <a:p>
-            <a:endParaRPr lang="fr-FR"/>
-          </a:p>
-        </p:txBody>
-      </p:sp>
+      <p:pic>
+        <p:nvPicPr>
+          <p:cNvPr id="8" name="Espace réservé pour une image  7">
+            <a:extLst>
+              <a:ext uri="{FF2B5EF4-FFF2-40B4-BE49-F238E27FC236}">
+                <a16:creationId xmlns:a16="http://schemas.microsoft.com/office/drawing/2014/main" id="{BFEFE8E0-B90C-444F-A2C6-4A4831977D90}"/>
+              </a:ext>
+            </a:extLst>
+          </p:cNvPr>
+          <p:cNvPicPr>
+            <a:picLocks noGrp="1" noChangeAspect="1"/>
+          </p:cNvPicPr>
+          <p:nvPr>
+            <p:ph type="pic" idx="1"/>
+          </p:nvPr>
+        </p:nvPicPr>
+        <p:blipFill rotWithShape="1">
+          <a:blip r:embed="rId2"/>
+          <a:srcRect l="255" b="2722"/>
+          <a:stretch/>
+        </p:blipFill>
+        <p:spPr>
+          <a:xfrm>
+            <a:off x="317421" y="962120"/>
+            <a:ext cx="8508527" cy="3497237"/>
+          </a:xfrm>
+        </p:spPr>
+      </p:pic>
     </p:spTree>
     <p:extLst>
       <p:ext uri="{BB962C8B-B14F-4D97-AF65-F5344CB8AC3E}">
-        <p14:creationId xmlns:p14="http://schemas.microsoft.com/office/powerpoint/2010/main" val="1554283246"/>
+        <p14:creationId xmlns:p14="http://schemas.microsoft.com/office/powerpoint/2010/main" val="649305809"/>
       </p:ext>
     </p:extLst>
   </p:cSld>
@@ -6318,12 +6312,12 @@
       </p:grpSpPr>
       <p:sp>
         <p:nvSpPr>
-          <p:cNvPr id="2" name="Espace réservé du texte 1"/>
-          <p:cNvSpPr>
-            <a:spLocks noGrp="1"/>
-          </p:cNvSpPr>
-          <p:nvPr>
-            <p:ph type="body" sz="quarter" idx="14"/>
+          <p:cNvPr id="5" name="Espace réservé du texte 4"/>
+          <p:cNvSpPr>
+            <a:spLocks noGrp="1"/>
+          </p:cNvSpPr>
+          <p:nvPr>
+            <p:ph type="body" sz="quarter" idx="13"/>
           </p:nvPr>
         </p:nvSpPr>
         <p:spPr/>
@@ -6337,12 +6331,88 @@
       </p:sp>
       <p:sp>
         <p:nvSpPr>
-          <p:cNvPr id="3" name="Espace réservé du texte 2"/>
+          <p:cNvPr id="3" name="Espace réservé du contenu 2"/>
+          <p:cNvSpPr>
+            <a:spLocks noGrp="1"/>
+          </p:cNvSpPr>
+          <p:nvPr>
+            <p:ph sz="half" idx="1"/>
+          </p:nvPr>
+        </p:nvSpPr>
+        <p:spPr/>
+        <p:txBody>
+          <a:bodyPr/>
+          <a:lstStyle/>
+          <a:p>
+            <a:endParaRPr lang="fr-FR"/>
+          </a:p>
+        </p:txBody>
+      </p:sp>
+      <p:sp>
+        <p:nvSpPr>
+          <p:cNvPr id="4" name="Espace réservé du contenu 3"/>
+          <p:cNvSpPr>
+            <a:spLocks noGrp="1"/>
+          </p:cNvSpPr>
+          <p:nvPr>
+            <p:ph sz="half" idx="2"/>
+          </p:nvPr>
+        </p:nvSpPr>
+        <p:spPr/>
+        <p:txBody>
+          <a:bodyPr/>
+          <a:lstStyle/>
+          <a:p>
+            <a:endParaRPr lang="fr-FR"/>
+          </a:p>
+        </p:txBody>
+      </p:sp>
+      <p:sp>
+        <p:nvSpPr>
+          <p:cNvPr id="2" name="Titre 1"/>
+          <p:cNvSpPr>
+            <a:spLocks noGrp="1"/>
+          </p:cNvSpPr>
+          <p:nvPr>
+            <p:ph type="title"/>
+          </p:nvPr>
+        </p:nvSpPr>
+        <p:spPr/>
+        <p:txBody>
+          <a:bodyPr/>
+          <a:lstStyle/>
+          <a:p>
+            <a:endParaRPr lang="fr-FR"/>
+          </a:p>
+        </p:txBody>
+      </p:sp>
+      <p:sp>
+        <p:nvSpPr>
+          <p:cNvPr id="6" name="Espace réservé du texte 5"/>
           <p:cNvSpPr>
             <a:spLocks noGrp="1"/>
           </p:cNvSpPr>
           <p:nvPr>
             <p:ph type="body" sz="quarter" idx="15"/>
+          </p:nvPr>
+        </p:nvSpPr>
+        <p:spPr/>
+        <p:txBody>
+          <a:bodyPr/>
+          <a:lstStyle/>
+          <a:p>
+            <a:endParaRPr lang="fr-FR"/>
+          </a:p>
+        </p:txBody>
+      </p:sp>
+      <p:sp>
+        <p:nvSpPr>
+          <p:cNvPr id="7" name="Espace réservé du texte 6"/>
+          <p:cNvSpPr>
+            <a:spLocks noGrp="1"/>
+          </p:cNvSpPr>
+          <p:nvPr>
+            <p:ph type="body" sz="quarter" idx="16"/>
           </p:nvPr>
         </p:nvSpPr>
         <p:spPr/>
@@ -6357,7 +6427,7 @@
     </p:spTree>
     <p:extLst>
       <p:ext uri="{BB962C8B-B14F-4D97-AF65-F5344CB8AC3E}">
-        <p14:creationId xmlns:p14="http://schemas.microsoft.com/office/powerpoint/2010/main" val="2647164006"/>
+        <p14:creationId xmlns:p14="http://schemas.microsoft.com/office/powerpoint/2010/main" val="1554283246"/>
       </p:ext>
     </p:extLst>
   </p:cSld>
@@ -6386,6 +6456,74 @@
       </p:grpSpPr>
       <p:sp>
         <p:nvSpPr>
+          <p:cNvPr id="2" name="Espace réservé du texte 1"/>
+          <p:cNvSpPr>
+            <a:spLocks noGrp="1"/>
+          </p:cNvSpPr>
+          <p:nvPr>
+            <p:ph type="body" sz="quarter" idx="14"/>
+          </p:nvPr>
+        </p:nvSpPr>
+        <p:spPr/>
+        <p:txBody>
+          <a:bodyPr/>
+          <a:lstStyle/>
+          <a:p>
+            <a:endParaRPr lang="fr-FR"/>
+          </a:p>
+        </p:txBody>
+      </p:sp>
+      <p:sp>
+        <p:nvSpPr>
+          <p:cNvPr id="3" name="Espace réservé du texte 2"/>
+          <p:cNvSpPr>
+            <a:spLocks noGrp="1"/>
+          </p:cNvSpPr>
+          <p:nvPr>
+            <p:ph type="body" sz="quarter" idx="15"/>
+          </p:nvPr>
+        </p:nvSpPr>
+        <p:spPr/>
+        <p:txBody>
+          <a:bodyPr/>
+          <a:lstStyle/>
+          <a:p>
+            <a:endParaRPr lang="fr-FR"/>
+          </a:p>
+        </p:txBody>
+      </p:sp>
+    </p:spTree>
+    <p:extLst>
+      <p:ext uri="{BB962C8B-B14F-4D97-AF65-F5344CB8AC3E}">
+        <p14:creationId xmlns:p14="http://schemas.microsoft.com/office/powerpoint/2010/main" val="2647164006"/>
+      </p:ext>
+    </p:extLst>
+  </p:cSld>
+  <p:clrMapOvr>
+    <a:masterClrMapping/>
+  </p:clrMapOvr>
+</p:sld>
+</file>
+
+<file path=ppt/slides/slide28.xml><?xml version="1.0" encoding="utf-8"?>
+<p:sld xmlns:a="http://schemas.openxmlformats.org/drawingml/2006/main" xmlns:r="http://schemas.openxmlformats.org/officeDocument/2006/relationships" xmlns:p="http://schemas.openxmlformats.org/presentationml/2006/main">
+  <p:cSld>
+    <p:spTree>
+      <p:nvGrpSpPr>
+        <p:cNvPr id="1" name=""/>
+        <p:cNvGrpSpPr/>
+        <p:nvPr/>
+      </p:nvGrpSpPr>
+      <p:grpSpPr>
+        <a:xfrm>
+          <a:off x="0" y="0"/>
+          <a:ext cx="0" cy="0"/>
+          <a:chOff x="0" y="0"/>
+          <a:chExt cx="0" cy="0"/>
+        </a:xfrm>
+      </p:grpSpPr>
+      <p:sp>
+        <p:nvSpPr>
           <p:cNvPr id="2" name="Titre 1"/>
           <p:cNvSpPr>
             <a:spLocks noGrp="1"/>
@@ -6497,7 +6635,7 @@
 </p:sld>
 </file>
 
-<file path=ppt/slides/slide28.xml><?xml version="1.0" encoding="utf-8"?>
+<file path=ppt/slides/slide29.xml><?xml version="1.0" encoding="utf-8"?>
 <p:sld xmlns:a="http://schemas.openxmlformats.org/drawingml/2006/main" xmlns:r="http://schemas.openxmlformats.org/officeDocument/2006/relationships" xmlns:p="http://schemas.openxmlformats.org/presentationml/2006/main">
   <p:cSld>
     <p:spTree>

</xml_diff>